<commit_message>
Refining cql grammar. Removed foreach, with, and from function invocation. Added value set literal. Added library definition and ensured library qualifiers can be used everywhere. Updated all examples and CQL update slides.
</commit_message>
<xml_diff>
--- a/CQL/Documents/CQLUpdate_AllHands_20140604.pptx
+++ b/CQL/Documents/CQLUpdate_AllHands_20140604.pptx
@@ -317,7 +317,7 @@
           <a:p>
             <a:fld id="{AE358F06-F08A-4581-9382-C6FEB46FADBD}" type="datetimeFigureOut">
               <a:rPr lang="en-US" smtClean="0"/>
-              <a:t>6/13/2014</a:t>
+              <a:t>6/23/2014</a:t>
             </a:fld>
             <a:endParaRPr lang="en-US"/>
           </a:p>
@@ -487,7 +487,7 @@
           <a:p>
             <a:fld id="{AE358F06-F08A-4581-9382-C6FEB46FADBD}" type="datetimeFigureOut">
               <a:rPr lang="en-US" smtClean="0"/>
-              <a:t>6/13/2014</a:t>
+              <a:t>6/23/2014</a:t>
             </a:fld>
             <a:endParaRPr lang="en-US"/>
           </a:p>
@@ -667,7 +667,7 @@
           <a:p>
             <a:fld id="{AE358F06-F08A-4581-9382-C6FEB46FADBD}" type="datetimeFigureOut">
               <a:rPr lang="en-US" smtClean="0"/>
-              <a:t>6/13/2014</a:t>
+              <a:t>6/23/2014</a:t>
             </a:fld>
             <a:endParaRPr lang="en-US"/>
           </a:p>
@@ -837,7 +837,7 @@
           <a:p>
             <a:fld id="{AE358F06-F08A-4581-9382-C6FEB46FADBD}" type="datetimeFigureOut">
               <a:rPr lang="en-US" smtClean="0"/>
-              <a:t>6/13/2014</a:t>
+              <a:t>6/23/2014</a:t>
             </a:fld>
             <a:endParaRPr lang="en-US"/>
           </a:p>
@@ -1083,7 +1083,7 @@
           <a:p>
             <a:fld id="{AE358F06-F08A-4581-9382-C6FEB46FADBD}" type="datetimeFigureOut">
               <a:rPr lang="en-US" smtClean="0"/>
-              <a:t>6/13/2014</a:t>
+              <a:t>6/23/2014</a:t>
             </a:fld>
             <a:endParaRPr lang="en-US"/>
           </a:p>
@@ -1371,7 +1371,7 @@
           <a:p>
             <a:fld id="{AE358F06-F08A-4581-9382-C6FEB46FADBD}" type="datetimeFigureOut">
               <a:rPr lang="en-US" smtClean="0"/>
-              <a:t>6/13/2014</a:t>
+              <a:t>6/23/2014</a:t>
             </a:fld>
             <a:endParaRPr lang="en-US"/>
           </a:p>
@@ -1793,7 +1793,7 @@
           <a:p>
             <a:fld id="{AE358F06-F08A-4581-9382-C6FEB46FADBD}" type="datetimeFigureOut">
               <a:rPr lang="en-US" smtClean="0"/>
-              <a:t>6/13/2014</a:t>
+              <a:t>6/23/2014</a:t>
             </a:fld>
             <a:endParaRPr lang="en-US"/>
           </a:p>
@@ -1911,7 +1911,7 @@
           <a:p>
             <a:fld id="{AE358F06-F08A-4581-9382-C6FEB46FADBD}" type="datetimeFigureOut">
               <a:rPr lang="en-US" smtClean="0"/>
-              <a:t>6/13/2014</a:t>
+              <a:t>6/23/2014</a:t>
             </a:fld>
             <a:endParaRPr lang="en-US"/>
           </a:p>
@@ -2006,7 +2006,7 @@
           <a:p>
             <a:fld id="{AE358F06-F08A-4581-9382-C6FEB46FADBD}" type="datetimeFigureOut">
               <a:rPr lang="en-US" smtClean="0"/>
-              <a:t>6/13/2014</a:t>
+              <a:t>6/23/2014</a:t>
             </a:fld>
             <a:endParaRPr lang="en-US"/>
           </a:p>
@@ -2283,7 +2283,7 @@
           <a:p>
             <a:fld id="{AE358F06-F08A-4581-9382-C6FEB46FADBD}" type="datetimeFigureOut">
               <a:rPr lang="en-US" smtClean="0"/>
-              <a:t>6/13/2014</a:t>
+              <a:t>6/23/2014</a:t>
             </a:fld>
             <a:endParaRPr lang="en-US"/>
           </a:p>
@@ -2536,7 +2536,7 @@
           <a:p>
             <a:fld id="{AE358F06-F08A-4581-9382-C6FEB46FADBD}" type="datetimeFigureOut">
               <a:rPr lang="en-US" smtClean="0"/>
-              <a:t>6/13/2014</a:t>
+              <a:t>6/23/2014</a:t>
             </a:fld>
             <a:endParaRPr lang="en-US"/>
           </a:p>
@@ -2749,7 +2749,7 @@
           <a:p>
             <a:fld id="{AE358F06-F08A-4581-9382-C6FEB46FADBD}" type="datetimeFigureOut">
               <a:rPr lang="en-US" smtClean="0"/>
-              <a:t>6/13/2014</a:t>
+              <a:t>6/23/2014</a:t>
             </a:fld>
             <a:endParaRPr lang="en-US"/>
           </a:p>
@@ -3244,7 +3244,7 @@
       </p:sp>
       <p:pic>
         <p:nvPicPr>
-          <p:cNvPr id="4" name="Picture 3"/>
+          <p:cNvPr id="5" name="Picture 4"/>
           <p:cNvPicPr>
             <a:picLocks noChangeAspect="1"/>
           </p:cNvPicPr>
@@ -3258,8 +3258,8 @@
         </p:blipFill>
         <p:spPr>
           <a:xfrm>
-            <a:off x="609600" y="1409170"/>
-            <a:ext cx="7478638" cy="5067829"/>
+            <a:off x="638664" y="1116553"/>
+            <a:ext cx="7866672" cy="5741447"/>
           </a:xfrm>
           <a:prstGeom prst="rect">
             <a:avLst/>
@@ -3328,7 +3328,7 @@
       </p:sp>
       <p:pic>
         <p:nvPicPr>
-          <p:cNvPr id="3" name="Picture 2"/>
+          <p:cNvPr id="6" name="Picture 5"/>
           <p:cNvPicPr>
             <a:picLocks noChangeAspect="1"/>
           </p:cNvPicPr>
@@ -3342,8 +3342,8 @@
         </p:blipFill>
         <p:spPr>
           <a:xfrm>
-            <a:off x="1843087" y="1600200"/>
-            <a:ext cx="5457825" cy="4791075"/>
+            <a:off x="1416928" y="1219200"/>
+            <a:ext cx="6310143" cy="5562600"/>
           </a:xfrm>
           <a:prstGeom prst="rect">
             <a:avLst/>
@@ -3412,7 +3412,7 @@
       </p:sp>
       <p:pic>
         <p:nvPicPr>
-          <p:cNvPr id="4" name="Picture 3"/>
+          <p:cNvPr id="6" name="Picture 5"/>
           <p:cNvPicPr>
             <a:picLocks noChangeAspect="1"/>
           </p:cNvPicPr>
@@ -3426,8 +3426,8 @@
         </p:blipFill>
         <p:spPr>
           <a:xfrm>
-            <a:off x="195837" y="1417638"/>
-            <a:ext cx="8752325" cy="4876800"/>
+            <a:off x="208547" y="1417638"/>
+            <a:ext cx="8726905" cy="4876800"/>
           </a:xfrm>
           <a:prstGeom prst="rect">
             <a:avLst/>
@@ -3489,7 +3489,7 @@
       </p:sp>
       <p:pic>
         <p:nvPicPr>
-          <p:cNvPr id="5" name="Picture 4"/>
+          <p:cNvPr id="3" name="Picture 2"/>
           <p:cNvPicPr>
             <a:picLocks noChangeAspect="1"/>
           </p:cNvPicPr>
@@ -3503,8 +3503,8 @@
         </p:blipFill>
         <p:spPr>
           <a:xfrm>
-            <a:off x="416718" y="1676400"/>
-            <a:ext cx="8310563" cy="3810000"/>
+            <a:off x="151849" y="1417638"/>
+            <a:ext cx="8840302" cy="4437715"/>
           </a:xfrm>
           <a:prstGeom prst="rect">
             <a:avLst/>
@@ -3597,7 +3597,15 @@
             <a:pPr lvl="1"/>
             <a:r>
               <a:rPr lang="en-US" dirty="0" smtClean="0"/>
-              <a:t>Mapping QLIM to FHIR</a:t>
+              <a:t>Mapping </a:t>
+            </a:r>
+            <a:r>
+              <a:rPr lang="en-US" dirty="0" smtClean="0"/>
+              <a:t>QUICK </a:t>
+            </a:r>
+            <a:r>
+              <a:rPr lang="en-US" dirty="0" smtClean="0"/>
+              <a:t>to FHIR</a:t>
             </a:r>
           </a:p>
           <a:p>
@@ -6372,7 +6380,7 @@
       </p:sp>
       <p:pic>
         <p:nvPicPr>
-          <p:cNvPr id="3" name="Picture 2"/>
+          <p:cNvPr id="5" name="Picture 4"/>
           <p:cNvPicPr>
             <a:picLocks noChangeAspect="1"/>
           </p:cNvPicPr>
@@ -6386,8 +6394,8 @@
         </p:blipFill>
         <p:spPr>
           <a:xfrm>
-            <a:off x="165279" y="1828800"/>
-            <a:ext cx="8813442" cy="3459162"/>
+            <a:off x="213114" y="1417638"/>
+            <a:ext cx="8717772" cy="3505200"/>
           </a:xfrm>
           <a:prstGeom prst="rect">
             <a:avLst/>
@@ -6456,7 +6464,7 @@
       </p:sp>
       <p:pic>
         <p:nvPicPr>
-          <p:cNvPr id="4" name="Picture 3"/>
+          <p:cNvPr id="3" name="Picture 2"/>
           <p:cNvPicPr>
             <a:picLocks noChangeAspect="1"/>
           </p:cNvPicPr>
@@ -6470,8 +6478,8 @@
         </p:blipFill>
         <p:spPr>
           <a:xfrm>
-            <a:off x="484577" y="2514600"/>
-            <a:ext cx="8202223" cy="2133600"/>
+            <a:off x="304800" y="2362200"/>
+            <a:ext cx="8301789" cy="2057400"/>
           </a:xfrm>
           <a:prstGeom prst="rect">
             <a:avLst/>
@@ -6624,7 +6632,7 @@
       </p:sp>
       <p:pic>
         <p:nvPicPr>
-          <p:cNvPr id="5" name="Picture 4"/>
+          <p:cNvPr id="4" name="Picture 3"/>
           <p:cNvPicPr>
             <a:picLocks noChangeAspect="1"/>
           </p:cNvPicPr>
@@ -6638,8 +6646,8 @@
         </p:blipFill>
         <p:spPr>
           <a:xfrm>
-            <a:off x="195261" y="1295400"/>
-            <a:ext cx="8821847" cy="5029200"/>
+            <a:off x="37737" y="1295400"/>
+            <a:ext cx="9068526" cy="5410200"/>
           </a:xfrm>
           <a:prstGeom prst="rect">
             <a:avLst/>

</xml_diff>

<commit_message>
Grammar fixes and changes to support translation. Example updates and additions.
</commit_message>
<xml_diff>
--- a/CQL/Documents/CQLUpdate_AllHands_20140604.pptx
+++ b/CQL/Documents/CQLUpdate_AllHands_20140604.pptx
@@ -8,8 +8,8 @@
     <p:sldId id="268" r:id="rId2"/>
     <p:sldId id="269" r:id="rId3"/>
     <p:sldId id="270" r:id="rId4"/>
-    <p:sldId id="271" r:id="rId5"/>
-    <p:sldId id="272" r:id="rId6"/>
+    <p:sldId id="273" r:id="rId5"/>
+    <p:sldId id="274" r:id="rId6"/>
     <p:sldId id="262" r:id="rId7"/>
     <p:sldId id="263" r:id="rId8"/>
     <p:sldId id="264" r:id="rId9"/>
@@ -317,7 +317,7 @@
           <a:p>
             <a:fld id="{AE358F06-F08A-4581-9382-C6FEB46FADBD}" type="datetimeFigureOut">
               <a:rPr lang="en-US" smtClean="0"/>
-              <a:t>6/23/2014</a:t>
+              <a:t>6/25/2014</a:t>
             </a:fld>
             <a:endParaRPr lang="en-US"/>
           </a:p>
@@ -487,7 +487,7 @@
           <a:p>
             <a:fld id="{AE358F06-F08A-4581-9382-C6FEB46FADBD}" type="datetimeFigureOut">
               <a:rPr lang="en-US" smtClean="0"/>
-              <a:t>6/23/2014</a:t>
+              <a:t>6/25/2014</a:t>
             </a:fld>
             <a:endParaRPr lang="en-US"/>
           </a:p>
@@ -667,7 +667,7 @@
           <a:p>
             <a:fld id="{AE358F06-F08A-4581-9382-C6FEB46FADBD}" type="datetimeFigureOut">
               <a:rPr lang="en-US" smtClean="0"/>
-              <a:t>6/23/2014</a:t>
+              <a:t>6/25/2014</a:t>
             </a:fld>
             <a:endParaRPr lang="en-US"/>
           </a:p>
@@ -837,7 +837,7 @@
           <a:p>
             <a:fld id="{AE358F06-F08A-4581-9382-C6FEB46FADBD}" type="datetimeFigureOut">
               <a:rPr lang="en-US" smtClean="0"/>
-              <a:t>6/23/2014</a:t>
+              <a:t>6/25/2014</a:t>
             </a:fld>
             <a:endParaRPr lang="en-US"/>
           </a:p>
@@ -1083,7 +1083,7 @@
           <a:p>
             <a:fld id="{AE358F06-F08A-4581-9382-C6FEB46FADBD}" type="datetimeFigureOut">
               <a:rPr lang="en-US" smtClean="0"/>
-              <a:t>6/23/2014</a:t>
+              <a:t>6/25/2014</a:t>
             </a:fld>
             <a:endParaRPr lang="en-US"/>
           </a:p>
@@ -1371,7 +1371,7 @@
           <a:p>
             <a:fld id="{AE358F06-F08A-4581-9382-C6FEB46FADBD}" type="datetimeFigureOut">
               <a:rPr lang="en-US" smtClean="0"/>
-              <a:t>6/23/2014</a:t>
+              <a:t>6/25/2014</a:t>
             </a:fld>
             <a:endParaRPr lang="en-US"/>
           </a:p>
@@ -1793,7 +1793,7 @@
           <a:p>
             <a:fld id="{AE358F06-F08A-4581-9382-C6FEB46FADBD}" type="datetimeFigureOut">
               <a:rPr lang="en-US" smtClean="0"/>
-              <a:t>6/23/2014</a:t>
+              <a:t>6/25/2014</a:t>
             </a:fld>
             <a:endParaRPr lang="en-US"/>
           </a:p>
@@ -1911,7 +1911,7 @@
           <a:p>
             <a:fld id="{AE358F06-F08A-4581-9382-C6FEB46FADBD}" type="datetimeFigureOut">
               <a:rPr lang="en-US" smtClean="0"/>
-              <a:t>6/23/2014</a:t>
+              <a:t>6/25/2014</a:t>
             </a:fld>
             <a:endParaRPr lang="en-US"/>
           </a:p>
@@ -2006,7 +2006,7 @@
           <a:p>
             <a:fld id="{AE358F06-F08A-4581-9382-C6FEB46FADBD}" type="datetimeFigureOut">
               <a:rPr lang="en-US" smtClean="0"/>
-              <a:t>6/23/2014</a:t>
+              <a:t>6/25/2014</a:t>
             </a:fld>
             <a:endParaRPr lang="en-US"/>
           </a:p>
@@ -2283,7 +2283,7 @@
           <a:p>
             <a:fld id="{AE358F06-F08A-4581-9382-C6FEB46FADBD}" type="datetimeFigureOut">
               <a:rPr lang="en-US" smtClean="0"/>
-              <a:t>6/23/2014</a:t>
+              <a:t>6/25/2014</a:t>
             </a:fld>
             <a:endParaRPr lang="en-US"/>
           </a:p>
@@ -2536,7 +2536,7 @@
           <a:p>
             <a:fld id="{AE358F06-F08A-4581-9382-C6FEB46FADBD}" type="datetimeFigureOut">
               <a:rPr lang="en-US" smtClean="0"/>
-              <a:t>6/23/2014</a:t>
+              <a:t>6/25/2014</a:t>
             </a:fld>
             <a:endParaRPr lang="en-US"/>
           </a:p>
@@ -2749,7 +2749,7 @@
           <a:p>
             <a:fld id="{AE358F06-F08A-4581-9382-C6FEB46FADBD}" type="datetimeFigureOut">
               <a:rPr lang="en-US" smtClean="0"/>
-              <a:t>6/23/2014</a:t>
+              <a:t>6/25/2014</a:t>
             </a:fld>
             <a:endParaRPr lang="en-US"/>
           </a:p>
@@ -3244,7 +3244,7 @@
       </p:sp>
       <p:pic>
         <p:nvPicPr>
-          <p:cNvPr id="5" name="Picture 4"/>
+          <p:cNvPr id="3" name="Picture 2"/>
           <p:cNvPicPr>
             <a:picLocks noChangeAspect="1"/>
           </p:cNvPicPr>
@@ -3258,8 +3258,8 @@
         </p:blipFill>
         <p:spPr>
           <a:xfrm>
-            <a:off x="638664" y="1116553"/>
-            <a:ext cx="7866672" cy="5741447"/>
+            <a:off x="880796" y="1417638"/>
+            <a:ext cx="7382407" cy="5029200"/>
           </a:xfrm>
           <a:prstGeom prst="rect">
             <a:avLst/>
@@ -3328,7 +3328,7 @@
       </p:sp>
       <p:pic>
         <p:nvPicPr>
-          <p:cNvPr id="6" name="Picture 5"/>
+          <p:cNvPr id="3" name="Picture 2"/>
           <p:cNvPicPr>
             <a:picLocks noChangeAspect="1"/>
           </p:cNvPicPr>
@@ -3342,8 +3342,8 @@
         </p:blipFill>
         <p:spPr>
           <a:xfrm>
-            <a:off x="1416928" y="1219200"/>
-            <a:ext cx="6310143" cy="5562600"/>
+            <a:off x="1445519" y="1417638"/>
+            <a:ext cx="6252961" cy="4983162"/>
           </a:xfrm>
           <a:prstGeom prst="rect">
             <a:avLst/>
@@ -3412,7 +3412,7 @@
       </p:sp>
       <p:pic>
         <p:nvPicPr>
-          <p:cNvPr id="6" name="Picture 5"/>
+          <p:cNvPr id="3" name="Picture 2"/>
           <p:cNvPicPr>
             <a:picLocks noChangeAspect="1"/>
           </p:cNvPicPr>
@@ -3426,8 +3426,8 @@
         </p:blipFill>
         <p:spPr>
           <a:xfrm>
-            <a:off x="208547" y="1417638"/>
-            <a:ext cx="8726905" cy="4876800"/>
+            <a:off x="381537" y="1676400"/>
+            <a:ext cx="8380925" cy="4297362"/>
           </a:xfrm>
           <a:prstGeom prst="rect">
             <a:avLst/>
@@ -3489,7 +3489,7 @@
       </p:sp>
       <p:pic>
         <p:nvPicPr>
-          <p:cNvPr id="3" name="Picture 2"/>
+          <p:cNvPr id="4" name="Picture 3"/>
           <p:cNvPicPr>
             <a:picLocks noChangeAspect="1"/>
           </p:cNvPicPr>
@@ -3503,8 +3503,8 @@
         </p:blipFill>
         <p:spPr>
           <a:xfrm>
-            <a:off x="151849" y="1417638"/>
-            <a:ext cx="8840302" cy="4437715"/>
+            <a:off x="367670" y="1828800"/>
+            <a:ext cx="8408659" cy="3810000"/>
           </a:xfrm>
           <a:prstGeom prst="rect">
             <a:avLst/>
@@ -3597,15 +3597,7 @@
             <a:pPr lvl="1"/>
             <a:r>
               <a:rPr lang="en-US" dirty="0" smtClean="0"/>
-              <a:t>Mapping </a:t>
-            </a:r>
-            <a:r>
-              <a:rPr lang="en-US" dirty="0" smtClean="0"/>
-              <a:t>QUICK </a:t>
-            </a:r>
-            <a:r>
-              <a:rPr lang="en-US" dirty="0" smtClean="0"/>
-              <a:t>to FHIR</a:t>
+              <a:t>Mapping QUICK to FHIR</a:t>
             </a:r>
           </a:p>
           <a:p>
@@ -5040,8 +5032,8 @@
           <a:p>
             <a:pPr algn="ctr"/>
             <a:r>
-              <a:rPr lang="en-US" smtClean="0"/>
-              <a:t>Concepts defined in Quality Logical Model</a:t>
+              <a:rPr lang="en-US" dirty="0" smtClean="0"/>
+              <a:t>Concepts defined in Quality Logical Model (QUICK)</a:t>
             </a:r>
             <a:endParaRPr lang="en-US" dirty="0"/>
           </a:p>
@@ -5705,19 +5697,19 @@
           <a:p>
             <a:r>
               <a:rPr lang="en-US" sz="2400" dirty="0" smtClean="0"/>
-              <a:t>Each rule or measure is readable, plain text file</a:t>
+              <a:t>Each library is a readable, plain text file</a:t>
             </a:r>
           </a:p>
           <a:p>
             <a:r>
               <a:rPr lang="en-US" sz="2400" dirty="0" smtClean="0"/>
-              <a:t>May include other files by reference</a:t>
+              <a:t>May include other libraries by reference</a:t>
             </a:r>
           </a:p>
           <a:p>
             <a:r>
               <a:rPr lang="en-US" sz="2400" dirty="0" smtClean="0"/>
-              <a:t>Logic in each file is a potentially reusable</a:t>
+              <a:t>Logic in each file is potentially reusable</a:t>
             </a:r>
             <a:r>
               <a:rPr lang="en-US" sz="2400" dirty="0"/>
@@ -5725,15 +5717,7 @@
             </a:r>
             <a:r>
               <a:rPr lang="en-US" sz="2400" dirty="0" smtClean="0"/>
-              <a:t>“</a:t>
-            </a:r>
-            <a:r>
-              <a:rPr lang="en-US" sz="2400" dirty="0"/>
-              <a:t>library</a:t>
-            </a:r>
-            <a:r>
-              <a:rPr lang="en-US" sz="2400" dirty="0" smtClean="0"/>
-              <a:t>” </a:t>
+              <a:t>by other libraries</a:t>
             </a:r>
           </a:p>
         </p:txBody>
@@ -6046,7 +6030,7 @@
         <p:spPr>
           <a:xfrm>
             <a:off x="1268479" y="4564561"/>
-            <a:ext cx="1232663" cy="830997"/>
+            <a:ext cx="1232663" cy="584775"/>
           </a:xfrm>
           <a:prstGeom prst="rect">
             <a:avLst/>
@@ -6061,17 +6045,9 @@
           <a:p>
             <a:pPr algn="ctr"/>
             <a:r>
-              <a:rPr lang="en-US" sz="1600" smtClean="0"/>
-              <a:t>May be comingled? </a:t>
-            </a:r>
-          </a:p>
-          <a:p>
-            <a:pPr algn="ctr"/>
-            <a:r>
-              <a:rPr lang="en-US" sz="1600" smtClean="0"/>
-              <a:t>(TBD)</a:t>
-            </a:r>
-            <a:endParaRPr lang="en-US" sz="1600"/>
+              <a:rPr lang="en-US" sz="1600" dirty="0" smtClean="0"/>
+              <a:t>May be comingled </a:t>
+            </a:r>
           </a:p>
         </p:txBody>
       </p:sp>
@@ -6087,7 +6063,7 @@
         <p:spPr>
           <a:xfrm flipV="1">
             <a:off x="2501142" y="4657984"/>
-            <a:ext cx="699261" cy="322076"/>
+            <a:ext cx="699261" cy="198965"/>
           </a:xfrm>
           <a:prstGeom prst="straightConnector1">
             <a:avLst/>
@@ -6122,8 +6098,8 @@
         </p:nvCxnSpPr>
         <p:spPr>
           <a:xfrm>
-            <a:off x="2501142" y="4980060"/>
-            <a:ext cx="699261" cy="365972"/>
+            <a:off x="2501142" y="4856949"/>
+            <a:ext cx="699261" cy="489081"/>
           </a:xfrm>
           <a:prstGeom prst="straightConnector1">
             <a:avLst/>
@@ -6150,20 +6126,13 @@
     </p:spTree>
     <p:extLst>
       <p:ext uri="{BB962C8B-B14F-4D97-AF65-F5344CB8AC3E}">
-        <p14:creationId xmlns:p14="http://schemas.microsoft.com/office/powerpoint/2010/main" val="4084638846"/>
+        <p14:creationId xmlns:p14="http://schemas.microsoft.com/office/powerpoint/2010/main" val="3361969057"/>
       </p:ext>
     </p:extLst>
   </p:cSld>
   <p:clrMapOvr>
     <a:masterClrMapping/>
   </p:clrMapOvr>
-  <p:timing>
-    <p:tnLst>
-      <p:par>
-        <p:cTn id="1" dur="indefinite" restart="never" nodeType="tmRoot"/>
-      </p:par>
-    </p:tnLst>
-  </p:timing>
 </p:sld>
 </file>
 
@@ -6230,7 +6199,11 @@
             </a:r>
             <a:r>
               <a:rPr lang="en-US" dirty="0" smtClean="0"/>
-              <a:t> declaration</a:t>
+              <a:t> </a:t>
+            </a:r>
+            <a:r>
+              <a:rPr lang="en-US" dirty="0" smtClean="0"/>
+              <a:t>declaration</a:t>
             </a:r>
           </a:p>
           <a:p>
@@ -6295,7 +6268,7 @@
             <a:pPr lvl="1"/>
             <a:r>
               <a:rPr lang="en-US" dirty="0" smtClean="0"/>
-              <a:t>Define available “inputs” (and potentially “outputs”, TBD)</a:t>
+              <a:t>Define available “inputs”</a:t>
             </a:r>
             <a:endParaRPr lang="en-US" b="1" dirty="0" smtClean="0"/>
           </a:p>
@@ -6321,20 +6294,13 @@
     </p:spTree>
     <p:extLst>
       <p:ext uri="{BB962C8B-B14F-4D97-AF65-F5344CB8AC3E}">
-        <p14:creationId xmlns:p14="http://schemas.microsoft.com/office/powerpoint/2010/main" val="2426096150"/>
+        <p14:creationId xmlns:p14="http://schemas.microsoft.com/office/powerpoint/2010/main" val="2971673985"/>
       </p:ext>
     </p:extLst>
   </p:cSld>
   <p:clrMapOvr>
     <a:masterClrMapping/>
   </p:clrMapOvr>
-  <p:timing>
-    <p:tnLst>
-      <p:par>
-        <p:cTn id="1" dur="indefinite" restart="never" nodeType="tmRoot"/>
-      </p:par>
-    </p:tnLst>
-  </p:timing>
 </p:sld>
 </file>
 
@@ -6380,7 +6346,7 @@
       </p:sp>
       <p:pic>
         <p:nvPicPr>
-          <p:cNvPr id="5" name="Picture 4"/>
+          <p:cNvPr id="3" name="Picture 2"/>
           <p:cNvPicPr>
             <a:picLocks noChangeAspect="1"/>
           </p:cNvPicPr>
@@ -6394,8 +6360,8 @@
         </p:blipFill>
         <p:spPr>
           <a:xfrm>
-            <a:off x="213114" y="1417638"/>
-            <a:ext cx="8717772" cy="3505200"/>
+            <a:off x="1072595" y="1752600"/>
+            <a:ext cx="6998809" cy="3382962"/>
           </a:xfrm>
           <a:prstGeom prst="rect">
             <a:avLst/>
@@ -6464,7 +6430,7 @@
       </p:sp>
       <p:pic>
         <p:nvPicPr>
-          <p:cNvPr id="3" name="Picture 2"/>
+          <p:cNvPr id="4" name="Picture 3"/>
           <p:cNvPicPr>
             <a:picLocks noChangeAspect="1"/>
           </p:cNvPicPr>
@@ -6478,8 +6444,8 @@
         </p:blipFill>
         <p:spPr>
           <a:xfrm>
-            <a:off x="304800" y="2362200"/>
-            <a:ext cx="8301789" cy="2057400"/>
+            <a:off x="581891" y="2667000"/>
+            <a:ext cx="7980218" cy="2057400"/>
           </a:xfrm>
           <a:prstGeom prst="rect">
             <a:avLst/>
@@ -6548,7 +6514,7 @@
       </p:sp>
       <p:pic>
         <p:nvPicPr>
-          <p:cNvPr id="3" name="Picture 2"/>
+          <p:cNvPr id="4" name="Picture 3"/>
           <p:cNvPicPr>
             <a:picLocks noChangeAspect="1"/>
           </p:cNvPicPr>
@@ -6562,8 +6528,8 @@
         </p:blipFill>
         <p:spPr>
           <a:xfrm>
-            <a:off x="117324" y="2057400"/>
-            <a:ext cx="8909352" cy="2209800"/>
+            <a:off x="556338" y="2362200"/>
+            <a:ext cx="8031324" cy="2514600"/>
           </a:xfrm>
           <a:prstGeom prst="rect">
             <a:avLst/>
@@ -6632,7 +6598,7 @@
       </p:sp>
       <p:pic>
         <p:nvPicPr>
-          <p:cNvPr id="4" name="Picture 3"/>
+          <p:cNvPr id="3" name="Picture 2"/>
           <p:cNvPicPr>
             <a:picLocks noChangeAspect="1"/>
           </p:cNvPicPr>
@@ -6646,8 +6612,8 @@
         </p:blipFill>
         <p:spPr>
           <a:xfrm>
-            <a:off x="37737" y="1295400"/>
-            <a:ext cx="9068526" cy="5410200"/>
+            <a:off x="40529" y="1417638"/>
+            <a:ext cx="9062941" cy="5105400"/>
           </a:xfrm>
           <a:prstGeom prst="rect">
             <a:avLst/>

</xml_diff>